<commit_message>
Add Easy Presentation of FMM
</commit_message>
<xml_diff>
--- a/Presentation_918_JiayuChen.pptx
+++ b/Presentation_918_JiayuChen.pptx
@@ -225,7 +225,7 @@
           <a:p>
             <a:fld id="{F724740E-8F52-4821-8A8D-03DDEC038A3B}" type="datetimeFigureOut">
               <a:rPr lang="zh-CN" altLang="en-US" smtClean="0"/>
-              <a:t>2023-09-18</a:t>
+              <a:t>2023-10-26</a:t>
             </a:fld>
             <a:endParaRPr lang="zh-CN" altLang="en-US"/>
           </a:p>
@@ -2145,7 +2145,7 @@
           <a:p>
             <a:fld id="{5647DC1B-4743-47FE-A400-A2B750CAD470}" type="datetimeFigureOut">
               <a:rPr lang="zh-CN" altLang="en-US" smtClean="0"/>
-              <a:t>2023-09-18</a:t>
+              <a:t>2023-10-26</a:t>
             </a:fld>
             <a:endParaRPr lang="zh-CN" altLang="en-US"/>
           </a:p>
@@ -2343,7 +2343,7 @@
           <a:p>
             <a:fld id="{5647DC1B-4743-47FE-A400-A2B750CAD470}" type="datetimeFigureOut">
               <a:rPr lang="zh-CN" altLang="en-US" smtClean="0"/>
-              <a:t>2023-09-18</a:t>
+              <a:t>2023-10-26</a:t>
             </a:fld>
             <a:endParaRPr lang="zh-CN" altLang="en-US"/>
           </a:p>
@@ -2551,7 +2551,7 @@
           <a:p>
             <a:fld id="{5647DC1B-4743-47FE-A400-A2B750CAD470}" type="datetimeFigureOut">
               <a:rPr lang="zh-CN" altLang="en-US" smtClean="0"/>
-              <a:t>2023-09-18</a:t>
+              <a:t>2023-10-26</a:t>
             </a:fld>
             <a:endParaRPr lang="zh-CN" altLang="en-US"/>
           </a:p>
@@ -2749,7 +2749,7 @@
           <a:p>
             <a:fld id="{5647DC1B-4743-47FE-A400-A2B750CAD470}" type="datetimeFigureOut">
               <a:rPr lang="zh-CN" altLang="en-US" smtClean="0"/>
-              <a:t>2023-09-18</a:t>
+              <a:t>2023-10-26</a:t>
             </a:fld>
             <a:endParaRPr lang="zh-CN" altLang="en-US"/>
           </a:p>
@@ -3024,7 +3024,7 @@
           <a:p>
             <a:fld id="{5647DC1B-4743-47FE-A400-A2B750CAD470}" type="datetimeFigureOut">
               <a:rPr lang="zh-CN" altLang="en-US" smtClean="0"/>
-              <a:t>2023-09-18</a:t>
+              <a:t>2023-10-26</a:t>
             </a:fld>
             <a:endParaRPr lang="zh-CN" altLang="en-US"/>
           </a:p>
@@ -3289,7 +3289,7 @@
           <a:p>
             <a:fld id="{5647DC1B-4743-47FE-A400-A2B750CAD470}" type="datetimeFigureOut">
               <a:rPr lang="zh-CN" altLang="en-US" smtClean="0"/>
-              <a:t>2023-09-18</a:t>
+              <a:t>2023-10-26</a:t>
             </a:fld>
             <a:endParaRPr lang="zh-CN" altLang="en-US"/>
           </a:p>
@@ -3701,7 +3701,7 @@
           <a:p>
             <a:fld id="{5647DC1B-4743-47FE-A400-A2B750CAD470}" type="datetimeFigureOut">
               <a:rPr lang="zh-CN" altLang="en-US" smtClean="0"/>
-              <a:t>2023-09-18</a:t>
+              <a:t>2023-10-26</a:t>
             </a:fld>
             <a:endParaRPr lang="zh-CN" altLang="en-US"/>
           </a:p>
@@ -3842,7 +3842,7 @@
           <a:p>
             <a:fld id="{5647DC1B-4743-47FE-A400-A2B750CAD470}" type="datetimeFigureOut">
               <a:rPr lang="zh-CN" altLang="en-US" smtClean="0"/>
-              <a:t>2023-09-18</a:t>
+              <a:t>2023-10-26</a:t>
             </a:fld>
             <a:endParaRPr lang="zh-CN" altLang="en-US"/>
           </a:p>
@@ -3955,7 +3955,7 @@
           <a:p>
             <a:fld id="{5647DC1B-4743-47FE-A400-A2B750CAD470}" type="datetimeFigureOut">
               <a:rPr lang="zh-CN" altLang="en-US" smtClean="0"/>
-              <a:t>2023-09-18</a:t>
+              <a:t>2023-10-26</a:t>
             </a:fld>
             <a:endParaRPr lang="zh-CN" altLang="en-US"/>
           </a:p>
@@ -4266,7 +4266,7 @@
           <a:p>
             <a:fld id="{5647DC1B-4743-47FE-A400-A2B750CAD470}" type="datetimeFigureOut">
               <a:rPr lang="zh-CN" altLang="en-US" smtClean="0"/>
-              <a:t>2023-09-18</a:t>
+              <a:t>2023-10-26</a:t>
             </a:fld>
             <a:endParaRPr lang="zh-CN" altLang="en-US"/>
           </a:p>
@@ -4554,7 +4554,7 @@
           <a:p>
             <a:fld id="{5647DC1B-4743-47FE-A400-A2B750CAD470}" type="datetimeFigureOut">
               <a:rPr lang="zh-CN" altLang="en-US" smtClean="0"/>
-              <a:t>2023-09-18</a:t>
+              <a:t>2023-10-26</a:t>
             </a:fld>
             <a:endParaRPr lang="zh-CN" altLang="en-US"/>
           </a:p>
@@ -4795,7 +4795,7 @@
           <a:p>
             <a:fld id="{5647DC1B-4743-47FE-A400-A2B750CAD470}" type="datetimeFigureOut">
               <a:rPr lang="zh-CN" altLang="en-US" smtClean="0"/>
-              <a:t>2023-09-18</a:t>
+              <a:t>2023-10-26</a:t>
             </a:fld>
             <a:endParaRPr lang="zh-CN" altLang="en-US"/>
           </a:p>
@@ -5693,7 +5693,7 @@
         </p:nvSpPr>
         <p:spPr>
           <a:xfrm>
-            <a:off x="6267450" y="2670133"/>
+            <a:off x="6200775" y="2670133"/>
             <a:ext cx="5991225" cy="3970318"/>
           </a:xfrm>
           <a:prstGeom prst="rect">
@@ -5885,7 +5885,7 @@
           <a:p>
             <a:r>
               <a:rPr lang="en-US" altLang="zh-CN" sz="2000" b="1" dirty="0"/>
-              <a:t>Why does common methods of obtaining the template result in poor performances for both S and D prediction, even in noise-free signals?</a:t>
+              <a:t>2 Why does methods of getting the template result in poor performances for both S and D prediction, even in noise-free signals?</a:t>
             </a:r>
           </a:p>
           <a:p>
@@ -6461,7 +6461,7 @@
           <a:p>
             <a:r>
               <a:rPr lang="en-US" altLang="zh-CN" sz="2000" b="1" dirty="0"/>
-              <a:t>Why the performance of K-shape is not satisfactory? </a:t>
+              <a:t>3 Why the performance of K-shape is not satisfactory? </a:t>
             </a:r>
           </a:p>
           <a:p>
@@ -8669,8 +8669,8 @@
         </p:nvSpPr>
         <p:spPr>
           <a:xfrm>
-            <a:off x="5219007" y="3105834"/>
-            <a:ext cx="1753985" cy="646331"/>
+            <a:off x="5114486" y="3105834"/>
+            <a:ext cx="1963028" cy="646331"/>
           </a:xfrm>
           <a:prstGeom prst="rect">
             <a:avLst/>
@@ -8839,7 +8839,7 @@
             </a:r>
             <a:r>
               <a:rPr lang="en-US" altLang="zh-CN" dirty="0" err="1"/>
-              <a:t>jupyter</a:t>
+              <a:t>Jupyter</a:t>
             </a:r>
             <a:r>
               <a:rPr lang="en-US" altLang="zh-CN" dirty="0"/>
@@ -8986,8 +8986,8 @@
         </p:nvSpPr>
         <p:spPr>
           <a:xfrm>
-            <a:off x="1816364" y="1513850"/>
-            <a:ext cx="9635068" cy="3508653"/>
+            <a:off x="1580144" y="1120676"/>
+            <a:ext cx="9635068" cy="4893647"/>
           </a:xfrm>
           <a:prstGeom prst="rect">
             <a:avLst/>
@@ -9127,6 +9127,45 @@
               </a:rPr>
               <a:t>Use 5 commands to show you the demo.</a:t>
             </a:r>
+          </a:p>
+          <a:p>
+            <a:pPr>
+              <a:defRPr/>
+            </a:pPr>
+            <a:endParaRPr lang="en-US" altLang="zh-CN" b="1" dirty="0">
+              <a:highlight>
+                <a:srgbClr val="FFFF00"/>
+              </a:highlight>
+            </a:endParaRPr>
+          </a:p>
+          <a:p>
+            <a:pPr>
+              <a:defRPr/>
+            </a:pPr>
+            <a:endParaRPr lang="en-US" altLang="zh-CN" sz="1800" b="1" dirty="0">
+              <a:highlight>
+                <a:srgbClr val="FFFF00"/>
+              </a:highlight>
+            </a:endParaRPr>
+          </a:p>
+          <a:p>
+            <a:pPr>
+              <a:defRPr/>
+            </a:pPr>
+            <a:r>
+              <a:rPr lang="en-US" altLang="zh-CN" b="1" dirty="0"/>
+              <a:t>Next week I will spend time improving the robustness of codes. </a:t>
+            </a:r>
+          </a:p>
+          <a:p>
+            <a:pPr>
+              <a:defRPr/>
+            </a:pPr>
+            <a:r>
+              <a:rPr lang="en-US" altLang="zh-CN" b="1" dirty="0"/>
+              <a:t>And you can reflect BUGs to me. Maybe I can create a google-doc. And you can post issues.</a:t>
+            </a:r>
+            <a:endParaRPr lang="en-US" altLang="zh-CN" sz="1800" b="1" dirty="0"/>
           </a:p>
         </p:txBody>
       </p:sp>
@@ -9224,7 +9263,7 @@
         <p:spPr>
           <a:xfrm>
             <a:off x="977634" y="927737"/>
-            <a:ext cx="10080892" cy="4247317"/>
+            <a:ext cx="10080892" cy="4555093"/>
           </a:xfrm>
           <a:prstGeom prst="rect">
             <a:avLst/>
@@ -9276,6 +9315,15 @@
             <a:pPr>
               <a:defRPr/>
             </a:pPr>
+            <a:r>
+              <a:rPr lang="en-US" altLang="zh-CN" dirty="0"/>
+              <a:t>This week I mainly focus on Wavelet denoising.</a:t>
+            </a:r>
+          </a:p>
+          <a:p>
+            <a:pPr>
+              <a:defRPr/>
+            </a:pPr>
             <a:endParaRPr lang="en-US" altLang="zh-CN" dirty="0"/>
           </a:p>
           <a:p>
@@ -9285,7 +9333,7 @@
             </a:pPr>
             <a:r>
               <a:rPr lang="en-US" altLang="zh-CN" dirty="0"/>
-              <a:t>Unique properties and shapes of different wavelets</a:t>
+              <a:t>Unique properties and shapes of different wavelets.</a:t>
             </a:r>
           </a:p>
           <a:p>
@@ -9321,7 +9369,7 @@
                   <a:srgbClr val="FFFF00"/>
                 </a:highlight>
               </a:rPr>
-              <a:t>Show the Notes.</a:t>
+              <a:t>Show notes easily.</a:t>
             </a:r>
           </a:p>
         </p:txBody>
@@ -9456,7 +9504,7 @@
           <a:p>
             <a:r>
               <a:rPr lang="en-US" altLang="zh-CN" dirty="0"/>
-              <a:t>Unlike last week’s 2 filters(Wiener and </a:t>
+              <a:t>Unlike last week’s 2 filters (Wiener and </a:t>
             </a:r>
             <a:r>
               <a:rPr lang="en-US" altLang="zh-CN" dirty="0" err="1"/>
@@ -9752,7 +9800,7 @@
           <a:p>
             <a:r>
               <a:rPr lang="en-US" altLang="zh-CN" dirty="0"/>
-              <a:t>Within a relatively short time, like 10 sec, patterns of echoes remain relatively consistent and don't exhibit significant variations.</a:t>
+              <a:t>I find, within a relatively short time, like 10 sec, patterns of echoes remain relatively consistent and don't exhibit significant variations.</a:t>
             </a:r>
           </a:p>
           <a:p>
@@ -11725,8 +11773,8 @@
         </p:nvSpPr>
         <p:spPr>
           <a:xfrm>
-            <a:off x="1800225" y="743671"/>
-            <a:ext cx="8591550" cy="2308324"/>
+            <a:off x="1633999" y="833120"/>
+            <a:ext cx="8924000" cy="2308324"/>
           </a:xfrm>
           <a:prstGeom prst="rect">
             <a:avLst/>
@@ -11750,7 +11798,7 @@
           <a:p>
             <a:r>
               <a:rPr lang="en-US" altLang="zh-CN" dirty="0"/>
-              <a:t>I did a simple comparison of algorithms that can recover a single-cycle signal, evaluating their performances on both noise-free and slightly noisy data.</a:t>
+              <a:t>Let’s begin with a comparison of algorithms that can recover a single-cycle signal, evaluating their performances on both noise-free and slightly noisy data.</a:t>
             </a:r>
           </a:p>
           <a:p>
@@ -11759,7 +11807,7 @@
           <a:p>
             <a:r>
               <a:rPr lang="en-US" altLang="zh-CN" dirty="0"/>
-              <a:t>I will give analyses in detail. </a:t>
+              <a:t>I will give analyses on this table in detail. </a:t>
             </a:r>
           </a:p>
         </p:txBody>
@@ -11779,13 +11827,13 @@
           <p:nvPr>
             <p:extLst>
               <p:ext uri="{D42A27DB-BD31-4B8C-83A1-F6EECF244321}">
-                <p14:modId xmlns:p14="http://schemas.microsoft.com/office/powerpoint/2010/main" val="1387020880"/>
+                <p14:modId xmlns:p14="http://schemas.microsoft.com/office/powerpoint/2010/main" val="4051909468"/>
               </p:ext>
             </p:extLst>
           </p:nvPr>
         </p:nvGraphicFramePr>
         <p:xfrm>
-          <a:off x="1928426" y="3429000"/>
+          <a:off x="2032000" y="3429000"/>
           <a:ext cx="8127999" cy="2595880"/>
         </p:xfrm>
         <a:graphic>
@@ -12347,7 +12395,7 @@
           <a:p>
             <a:r>
               <a:rPr lang="en-US" altLang="zh-CN" sz="2000" b="1" dirty="0"/>
-              <a:t>Comparison of ‘No Template’ method and ‘Get Template’ method</a:t>
+              <a:t>1 Comparison of ‘No Template’ method and ‘Get Template’ method</a:t>
             </a:r>
           </a:p>
           <a:p>

</xml_diff>